<commit_message>
Added Justin's Battle System
Added Justin's code to the repository.
</commit_message>
<xml_diff>
--- a/Presentation/Team Report.pptx
+++ b/Presentation/Team Report.pptx
@@ -108,6 +108,11 @@
       </a:defRPr>
     </a:lvl9pPr>
   </p:defaultTextStyle>
+  <p:extLst>
+    <p:ext uri="{EFAFB233-063F-42B5-8137-9DF3F51BA10A}">
+      <p15:sldGuideLst xmlns:p15="http://schemas.microsoft.com/office/powerpoint/2012/main"/>
+    </p:ext>
+  </p:extLst>
 </p:presentation>
 </file>
 
@@ -281,7 +286,7 @@
           <a:p>
             <a:fld id="{48A87A34-81AB-432B-8DAE-1953F412C126}" type="datetimeFigureOut">
               <a:rPr lang="en-US" dirty="0"/>
-              <a:t>2/21/2014</a:t>
+              <a:t>2/24/2014</a:t>
             </a:fld>
             <a:endParaRPr lang="en-US" dirty="0"/>
           </a:p>
@@ -543,7 +548,7 @@
           <a:p>
             <a:fld id="{48A87A34-81AB-432B-8DAE-1953F412C126}" type="datetimeFigureOut">
               <a:rPr lang="en-US" dirty="0"/>
-              <a:t>2/21/2014</a:t>
+              <a:t>2/24/2014</a:t>
             </a:fld>
             <a:endParaRPr lang="en-US" dirty="0"/>
           </a:p>
@@ -770,7 +775,7 @@
             <a:fld id="{48A87A34-81AB-432B-8DAE-1953F412C126}" type="datetimeFigureOut">
               <a:rPr lang="en-US" dirty="0"/>
               <a:pPr/>
-              <a:t>2/21/2014</a:t>
+              <a:t>2/24/2014</a:t>
             </a:fld>
             <a:endParaRPr lang="en-US" dirty="0"/>
           </a:p>
@@ -1076,7 +1081,7 @@
             <a:fld id="{48A87A34-81AB-432B-8DAE-1953F412C126}" type="datetimeFigureOut">
               <a:rPr lang="en-US" dirty="0"/>
               <a:pPr/>
-              <a:t>2/21/2014</a:t>
+              <a:t>2/24/2014</a:t>
             </a:fld>
             <a:endParaRPr lang="en-US" dirty="0"/>
           </a:p>
@@ -1545,7 +1550,7 @@
             <a:fld id="{48A87A34-81AB-432B-8DAE-1953F412C126}" type="datetimeFigureOut">
               <a:rPr lang="en-US" dirty="0"/>
               <a:pPr/>
-              <a:t>2/21/2014</a:t>
+              <a:t>2/24/2014</a:t>
             </a:fld>
             <a:endParaRPr lang="en-US" dirty="0"/>
           </a:p>
@@ -2087,7 +2092,7 @@
           <a:p>
             <a:fld id="{48A87A34-81AB-432B-8DAE-1953F412C126}" type="datetimeFigureOut">
               <a:rPr lang="en-US" dirty="0"/>
-              <a:t>2/21/2014</a:t>
+              <a:t>2/24/2014</a:t>
             </a:fld>
             <a:endParaRPr lang="en-US" dirty="0"/>
           </a:p>
@@ -2856,7 +2861,7 @@
           <a:p>
             <a:fld id="{48A87A34-81AB-432B-8DAE-1953F412C126}" type="datetimeFigureOut">
               <a:rPr lang="en-US" dirty="0"/>
-              <a:t>2/21/2014</a:t>
+              <a:t>2/24/2014</a:t>
             </a:fld>
             <a:endParaRPr lang="en-US" dirty="0"/>
           </a:p>
@@ -3026,7 +3031,7 @@
           <a:p>
             <a:fld id="{48A87A34-81AB-432B-8DAE-1953F412C126}" type="datetimeFigureOut">
               <a:rPr lang="en-US" dirty="0"/>
-              <a:t>2/21/2014</a:t>
+              <a:t>2/24/2014</a:t>
             </a:fld>
             <a:endParaRPr lang="en-US" dirty="0"/>
           </a:p>
@@ -3245,7 +3250,7 @@
             <a:fld id="{48A87A34-81AB-432B-8DAE-1953F412C126}" type="datetimeFigureOut">
               <a:rPr lang="en-US" dirty="0"/>
               <a:pPr/>
-              <a:t>2/21/2014</a:t>
+              <a:t>2/24/2014</a:t>
             </a:fld>
             <a:endParaRPr lang="en-US" dirty="0"/>
           </a:p>
@@ -3420,7 +3425,7 @@
           <a:p>
             <a:fld id="{48A87A34-81AB-432B-8DAE-1953F412C126}" type="datetimeFigureOut">
               <a:rPr lang="en-US" dirty="0"/>
-              <a:t>2/21/2014</a:t>
+              <a:t>2/24/2014</a:t>
             </a:fld>
             <a:endParaRPr lang="en-US" dirty="0"/>
           </a:p>
@@ -3705,7 +3710,7 @@
             <a:fld id="{48A87A34-81AB-432B-8DAE-1953F412C126}" type="datetimeFigureOut">
               <a:rPr lang="en-US" dirty="0"/>
               <a:pPr/>
-              <a:t>2/21/2014</a:t>
+              <a:t>2/24/2014</a:t>
             </a:fld>
             <a:endParaRPr lang="en-US" dirty="0"/>
           </a:p>
@@ -3942,7 +3947,7 @@
           <a:p>
             <a:fld id="{48A87A34-81AB-432B-8DAE-1953F412C126}" type="datetimeFigureOut">
               <a:rPr lang="en-US" dirty="0"/>
-              <a:t>2/21/2014</a:t>
+              <a:t>2/24/2014</a:t>
             </a:fld>
             <a:endParaRPr lang="en-US" dirty="0"/>
           </a:p>
@@ -4316,7 +4321,7 @@
           <a:p>
             <a:fld id="{48A87A34-81AB-432B-8DAE-1953F412C126}" type="datetimeFigureOut">
               <a:rPr lang="en-US" dirty="0"/>
-              <a:t>2/21/2014</a:t>
+              <a:t>2/24/2014</a:t>
             </a:fld>
             <a:endParaRPr lang="en-US" dirty="0"/>
           </a:p>
@@ -4429,7 +4434,7 @@
           <a:p>
             <a:fld id="{48A87A34-81AB-432B-8DAE-1953F412C126}" type="datetimeFigureOut">
               <a:rPr lang="en-US" dirty="0"/>
-              <a:t>2/21/2014</a:t>
+              <a:t>2/24/2014</a:t>
             </a:fld>
             <a:endParaRPr lang="en-US" dirty="0"/>
           </a:p>
@@ -4519,7 +4524,7 @@
           <a:p>
             <a:fld id="{48A87A34-81AB-432B-8DAE-1953F412C126}" type="datetimeFigureOut">
               <a:rPr lang="en-US" dirty="0"/>
-              <a:t>2/21/2014</a:t>
+              <a:t>2/24/2014</a:t>
             </a:fld>
             <a:endParaRPr lang="en-US" dirty="0"/>
           </a:p>
@@ -4763,7 +4768,7 @@
           <a:p>
             <a:fld id="{48A87A34-81AB-432B-8DAE-1953F412C126}" type="datetimeFigureOut">
               <a:rPr lang="en-US" dirty="0"/>
-              <a:t>2/21/2014</a:t>
+              <a:t>2/24/2014</a:t>
             </a:fld>
             <a:endParaRPr lang="en-US" dirty="0"/>
           </a:p>
@@ -5015,7 +5020,7 @@
           <a:p>
             <a:fld id="{48A87A34-81AB-432B-8DAE-1953F412C126}" type="datetimeFigureOut">
               <a:rPr lang="en-US" dirty="0"/>
-              <a:t>2/21/2014</a:t>
+              <a:t>2/24/2014</a:t>
             </a:fld>
             <a:endParaRPr lang="en-US" dirty="0"/>
           </a:p>
@@ -5254,7 +5259,7 @@
             <a:fld id="{48A87A34-81AB-432B-8DAE-1953F412C126}" type="datetimeFigureOut">
               <a:rPr lang="en-US" dirty="0"/>
               <a:pPr/>
-              <a:t>2/21/2014</a:t>
+              <a:t>2/24/2014</a:t>
             </a:fld>
             <a:endParaRPr lang="en-US" dirty="0"/>
           </a:p>
@@ -6008,7 +6013,19 @@
           <a:p>
             <a:r>
               <a:rPr lang="en-US" dirty="0" smtClean="0"/>
-              <a:t>Tiles can be walls well.</a:t>
+              <a:t>Tiles can </a:t>
+            </a:r>
+            <a:r>
+              <a:rPr lang="en-US" smtClean="0"/>
+              <a:t>be </a:t>
+            </a:r>
+            <a:r>
+              <a:rPr lang="en-US" smtClean="0"/>
+              <a:t>walls as </a:t>
+            </a:r>
+            <a:r>
+              <a:rPr lang="en-US" dirty="0" smtClean="0"/>
+              <a:t>well.</a:t>
             </a:r>
             <a:endParaRPr lang="en-US" dirty="0"/>
           </a:p>

</xml_diff>

<commit_message>
Updated Presentation and Added Comments
Updated the presentation for (maybe) tomorrow. Added comments through
out code on how certain systems will maybe work.
</commit_message>
<xml_diff>
--- a/Presentation/Team Report.pptx
+++ b/Presentation/Team Report.pptx
@@ -10,6 +10,7 @@
     <p:sldId id="257" r:id="rId4"/>
     <p:sldId id="259" r:id="rId5"/>
     <p:sldId id="258" r:id="rId6"/>
+    <p:sldId id="261" r:id="rId7"/>
   </p:sldIdLst>
   <p:sldSz cx="12192000" cy="6858000"/>
   <p:notesSz cx="6858000" cy="9144000"/>
@@ -6013,14 +6014,10 @@
           <a:p>
             <a:r>
               <a:rPr lang="en-US" dirty="0" smtClean="0"/>
-              <a:t>Tiles can </a:t>
-            </a:r>
-            <a:r>
-              <a:rPr lang="en-US" smtClean="0"/>
-              <a:t>be </a:t>
-            </a:r>
-            <a:r>
-              <a:rPr lang="en-US" smtClean="0"/>
+              <a:t>Tiles can be </a:t>
+            </a:r>
+            <a:r>
+              <a:rPr lang="en-US" dirty="0" smtClean="0"/>
               <a:t>walls as </a:t>
             </a:r>
             <a:r>
@@ -6150,6 +6147,158 @@
     <p:extLst>
       <p:ext uri="{BB962C8B-B14F-4D97-AF65-F5344CB8AC3E}">
         <p14:creationId xmlns:p14="http://schemas.microsoft.com/office/powerpoint/2010/main" val="1188051609"/>
+      </p:ext>
+    </p:extLst>
+  </p:cSld>
+  <p:clrMapOvr>
+    <a:masterClrMapping/>
+  </p:clrMapOvr>
+  <p:timing>
+    <p:tnLst>
+      <p:par>
+        <p:cTn id="1" dur="indefinite" restart="never" nodeType="tmRoot"/>
+      </p:par>
+    </p:tnLst>
+  </p:timing>
+</p:sld>
+</file>
+
+<file path=ppt/slides/slide6.xml><?xml version="1.0" encoding="utf-8"?>
+<p:sld xmlns:a="http://schemas.openxmlformats.org/drawingml/2006/main" xmlns:r="http://schemas.openxmlformats.org/officeDocument/2006/relationships" xmlns:p="http://schemas.openxmlformats.org/presentationml/2006/main">
+  <p:cSld>
+    <p:spTree>
+      <p:nvGrpSpPr>
+        <p:cNvPr id="1" name=""/>
+        <p:cNvGrpSpPr/>
+        <p:nvPr/>
+      </p:nvGrpSpPr>
+      <p:grpSpPr>
+        <a:xfrm>
+          <a:off x="0" y="0"/>
+          <a:ext cx="0" cy="0"/>
+          <a:chOff x="0" y="0"/>
+          <a:chExt cx="0" cy="0"/>
+        </a:xfrm>
+      </p:grpSpPr>
+      <p:sp>
+        <p:nvSpPr>
+          <p:cNvPr id="2" name="Title 1"/>
+          <p:cNvSpPr>
+            <a:spLocks noGrp="1"/>
+          </p:cNvSpPr>
+          <p:nvPr>
+            <p:ph type="title"/>
+          </p:nvPr>
+        </p:nvSpPr>
+        <p:spPr/>
+        <p:txBody>
+          <a:bodyPr/>
+          <a:lstStyle/>
+          <a:p>
+            <a:r>
+              <a:rPr lang="en-US" dirty="0" smtClean="0"/>
+              <a:t>Battle System</a:t>
+            </a:r>
+            <a:endParaRPr lang="en-US" dirty="0"/>
+          </a:p>
+        </p:txBody>
+      </p:sp>
+      <p:sp>
+        <p:nvSpPr>
+          <p:cNvPr id="3" name="Content Placeholder 2"/>
+          <p:cNvSpPr>
+            <a:spLocks noGrp="1"/>
+          </p:cNvSpPr>
+          <p:nvPr>
+            <p:ph idx="1"/>
+          </p:nvPr>
+        </p:nvSpPr>
+        <p:spPr/>
+        <p:txBody>
+          <a:bodyPr/>
+          <a:lstStyle/>
+          <a:p>
+            <a:r>
+              <a:rPr lang="en-US" dirty="0" smtClean="0"/>
+              <a:t>Handles logic and events in a battle.</a:t>
+            </a:r>
+          </a:p>
+          <a:p>
+            <a:r>
+              <a:rPr lang="en-US" dirty="0" smtClean="0"/>
+              <a:t>Turn-based.</a:t>
+            </a:r>
+          </a:p>
+          <a:p>
+            <a:r>
+              <a:rPr lang="en-US" dirty="0" smtClean="0"/>
+              <a:t>Get </a:t>
+            </a:r>
+            <a:r>
+              <a:rPr lang="en-US" dirty="0"/>
+              <a:t>good and bad guys.</a:t>
+            </a:r>
+          </a:p>
+          <a:p>
+            <a:r>
+              <a:rPr lang="en-US" dirty="0" smtClean="0"/>
+              <a:t>Create </a:t>
+            </a:r>
+            <a:r>
+              <a:rPr lang="en-US" dirty="0"/>
+              <a:t>an array that can hold all characters.</a:t>
+            </a:r>
+          </a:p>
+          <a:p>
+            <a:r>
+              <a:rPr lang="en-US" dirty="0" smtClean="0"/>
+              <a:t>Sort </a:t>
+            </a:r>
+            <a:r>
+              <a:rPr lang="en-US" dirty="0"/>
+              <a:t>array by agility.</a:t>
+            </a:r>
+          </a:p>
+          <a:p>
+            <a:r>
+              <a:rPr lang="en-US" dirty="0" smtClean="0"/>
+              <a:t>Loop </a:t>
+            </a:r>
+            <a:r>
+              <a:rPr lang="en-US" dirty="0"/>
+              <a:t>through array, giving each character a turn. Start over at the first element you the last goes</a:t>
+            </a:r>
+            <a:r>
+              <a:rPr lang="en-US" dirty="0" smtClean="0"/>
+              <a:t>.</a:t>
+            </a:r>
+          </a:p>
+          <a:p>
+            <a:r>
+              <a:rPr lang="en-US" dirty="0" smtClean="0"/>
+              <a:t>For </a:t>
+            </a:r>
+            <a:r>
+              <a:rPr lang="en-US" dirty="0"/>
+              <a:t>each players turn, MATH and handle choices</a:t>
+            </a:r>
+            <a:r>
+              <a:rPr lang="en-US" dirty="0" smtClean="0"/>
+              <a:t>.</a:t>
+            </a:r>
+          </a:p>
+          <a:p>
+            <a:r>
+              <a:rPr lang="en-US" dirty="0" smtClean="0"/>
+              <a:t>Uses strategy pattern to handle what occurs in battle.</a:t>
+            </a:r>
+          </a:p>
+        </p:txBody>
+      </p:sp>
+    </p:spTree>
+    <p:extLst>
+      <p:ext uri="{BB962C8B-B14F-4D97-AF65-F5344CB8AC3E}">
+        <p14:creationId xmlns:p14="http://schemas.microsoft.com/office/powerpoint/2010/main" val="2081787875"/>
       </p:ext>
     </p:extLst>
   </p:cSld>

</xml_diff>